<commit_message>
Updated Hybrid Apps slides
</commit_message>
<xml_diff>
--- a/projectmanagement/Hybrid vs. SPA.pptx
+++ b/projectmanagement/Hybrid vs. SPA.pptx
@@ -9,7 +9,7 @@
     <p:sldId id="258" r:id="rId3"/>
     <p:sldId id="259" r:id="rId4"/>
     <p:sldId id="257" r:id="rId5"/>
-    <p:sldId id="260" r:id="rId6"/>
+    <p:sldId id="262" r:id="rId6"/>
     <p:sldId id="261" r:id="rId7"/>
   </p:sldIdLst>
   <p:sldSz cx="12192000" cy="6858000"/>
@@ -109,6 +109,11 @@
       </a:defRPr>
     </a:lvl9pPr>
   </p:defaultTextStyle>
+  <p:extLst>
+    <p:ext uri="{EFAFB233-063F-42B5-8137-9DF3F51BA10A}">
+      <p15:sldGuideLst xmlns:p15="http://schemas.microsoft.com/office/powerpoint/2012/main"/>
+    </p:ext>
+  </p:extLst>
 </p:presentation>
 </file>
 
@@ -3484,29 +3489,75 @@
           <a:lstStyle/>
           <a:p>
             <a:r>
+              <a:rPr lang="de-DE" sz="3200" dirty="0"/>
+              <a:t>Hybrid</a:t>
+            </a:r>
+            <a:endParaRPr lang="de-DE" dirty="0"/>
+          </a:p>
+        </p:txBody>
+      </p:sp>
+      <p:sp>
+        <p:nvSpPr>
+          <p:cNvPr id="4" name="Content Placeholder 3"/>
+          <p:cNvSpPr>
+            <a:spLocks noGrp="1"/>
+          </p:cNvSpPr>
+          <p:nvPr>
+            <p:ph sz="half" idx="2"/>
+          </p:nvPr>
+        </p:nvSpPr>
+        <p:spPr/>
+        <p:txBody>
+          <a:bodyPr/>
+          <a:lstStyle/>
+          <a:p>
+            <a:r>
               <a:rPr lang="de-DE" dirty="0"/>
-              <a:t>Hybrid</a:t>
-            </a:r>
-          </a:p>
-        </p:txBody>
-      </p:sp>
-      <p:sp>
-        <p:nvSpPr>
-          <p:cNvPr id="4" name="Content Placeholder 3"/>
-          <p:cNvSpPr>
-            <a:spLocks noGrp="1"/>
-          </p:cNvSpPr>
-          <p:nvPr>
-            <p:ph sz="half" idx="2"/>
-          </p:nvPr>
-        </p:nvSpPr>
-        <p:spPr/>
-        <p:txBody>
-          <a:bodyPr/>
-          <a:lstStyle/>
-          <a:p>
+              <a:t>Zusätzliche Konfiguration notwendig</a:t>
+            </a:r>
+          </a:p>
+          <a:p>
+            <a:r>
+              <a:rPr lang="de-DE" dirty="0" err="1"/>
+              <a:t>Compilieren</a:t>
+            </a:r>
+            <a:r>
+              <a:rPr lang="de-DE" dirty="0"/>
+              <a:t> und Veröffentlichen</a:t>
+            </a:r>
+          </a:p>
+          <a:p>
+            <a:pPr marL="0" indent="0">
+              <a:buNone/>
+            </a:pPr>
             <a:endParaRPr lang="de-DE" dirty="0"/>
           </a:p>
+          <a:p>
+            <a:r>
+              <a:rPr lang="de-DE" b="1" dirty="0">
+                <a:solidFill>
+                  <a:schemeClr val="accent6"/>
+                </a:solidFill>
+              </a:rPr>
+              <a:t>Zugriff auf native </a:t>
+            </a:r>
+            <a:r>
+              <a:rPr lang="de-DE" b="1" dirty="0" err="1">
+                <a:solidFill>
+                  <a:schemeClr val="accent6"/>
+                </a:solidFill>
+              </a:rPr>
+              <a:t>Betriebsssystem</a:t>
+            </a:r>
+            <a:r>
+              <a:rPr lang="de-DE" b="1" dirty="0">
+                <a:solidFill>
+                  <a:schemeClr val="accent6"/>
+                </a:solidFill>
+              </a:rPr>
+              <a:t>-Funktionen (GPS, Speicher, Kamera)</a:t>
+            </a:r>
+          </a:p>
         </p:txBody>
       </p:sp>
       <p:sp>
@@ -3521,32 +3572,93 @@
         </p:nvSpPr>
         <p:spPr/>
         <p:txBody>
-          <a:bodyPr/>
-          <a:lstStyle/>
-          <a:p>
+          <a:bodyPr>
+            <a:normAutofit/>
+          </a:bodyPr>
+          <a:lstStyle/>
+          <a:p>
+            <a:r>
+              <a:rPr lang="de-DE" sz="3200" dirty="0"/>
+              <a:t>Web-App (SPA)</a:t>
+            </a:r>
+          </a:p>
+        </p:txBody>
+      </p:sp>
+      <p:sp>
+        <p:nvSpPr>
+          <p:cNvPr id="6" name="Content Placeholder 5"/>
+          <p:cNvSpPr>
+            <a:spLocks noGrp="1"/>
+          </p:cNvSpPr>
+          <p:nvPr>
+            <p:ph sz="quarter" idx="4"/>
+          </p:nvPr>
+        </p:nvSpPr>
+        <p:spPr/>
+        <p:txBody>
+          <a:bodyPr/>
+          <a:lstStyle/>
+          <a:p>
+            <a:r>
+              <a:rPr lang="de-DE" b="1" dirty="0">
+                <a:solidFill>
+                  <a:schemeClr val="accent6"/>
+                </a:solidFill>
+              </a:rPr>
+              <a:t>Einfache Web-Entwicklung (+ evtl. Frameworks)</a:t>
+            </a:r>
+          </a:p>
+          <a:p>
+            <a:r>
+              <a:rPr lang="de-DE" b="1" dirty="0">
+                <a:solidFill>
+                  <a:schemeClr val="accent6"/>
+                </a:solidFill>
+              </a:rPr>
+              <a:t>Kein </a:t>
+            </a:r>
+            <a:r>
+              <a:rPr lang="de-DE" b="1" dirty="0" err="1">
+                <a:solidFill>
+                  <a:schemeClr val="accent6"/>
+                </a:solidFill>
+              </a:rPr>
+              <a:t>Compilieren</a:t>
+            </a:r>
+            <a:r>
+              <a:rPr lang="de-DE" b="1" dirty="0">
+                <a:solidFill>
+                  <a:schemeClr val="accent6"/>
+                </a:solidFill>
+              </a:rPr>
+              <a:t> -&gt; </a:t>
+            </a:r>
+            <a:r>
+              <a:rPr lang="de-DE" b="1" dirty="0" err="1">
+                <a:solidFill>
+                  <a:schemeClr val="accent6"/>
+                </a:solidFill>
+              </a:rPr>
+              <a:t>Deploy</a:t>
+            </a:r>
+            <a:r>
+              <a:rPr lang="de-DE" b="1" dirty="0">
+                <a:solidFill>
+                  <a:schemeClr val="accent6"/>
+                </a:solidFill>
+              </a:rPr>
+              <a:t> auf Webserver</a:t>
+            </a:r>
+          </a:p>
+          <a:p>
+            <a:r>
+              <a:rPr lang="de-DE" dirty="0" err="1"/>
+              <a:t>Runtime</a:t>
+            </a:r>
             <a:r>
               <a:rPr lang="de-DE" dirty="0"/>
-              <a:t>Web-App (SPA)</a:t>
-            </a:r>
-          </a:p>
-        </p:txBody>
-      </p:sp>
-      <p:sp>
-        <p:nvSpPr>
-          <p:cNvPr id="6" name="Content Placeholder 5"/>
-          <p:cNvSpPr>
-            <a:spLocks noGrp="1"/>
-          </p:cNvSpPr>
-          <p:nvPr>
-            <p:ph sz="quarter" idx="4"/>
-          </p:nvPr>
-        </p:nvSpPr>
-        <p:spPr/>
-        <p:txBody>
-          <a:bodyPr/>
-          <a:lstStyle/>
-          <a:p>
-            <a:endParaRPr lang="de-DE"/>
+              <a:t> im isolierten Container</a:t>
+            </a:r>
           </a:p>
         </p:txBody>
       </p:sp>
@@ -3625,8 +3737,30 @@
           <a:lstStyle/>
           <a:p>
             <a:r>
-              <a:rPr lang="de-DE"/>
-              <a:t>Hybrid vs. Web-App – Seite 2</a:t>
+              <a:rPr lang="de-DE" dirty="0"/>
+              <a:t>Hybrid vs. Web-App – Seite 1</a:t>
+            </a:r>
+          </a:p>
+        </p:txBody>
+      </p:sp>
+      <p:sp>
+        <p:nvSpPr>
+          <p:cNvPr id="3" name="Text Placeholder 2"/>
+          <p:cNvSpPr>
+            <a:spLocks noGrp="1"/>
+          </p:cNvSpPr>
+          <p:nvPr>
+            <p:ph type="body" idx="1"/>
+          </p:nvPr>
+        </p:nvSpPr>
+        <p:spPr/>
+        <p:txBody>
+          <a:bodyPr/>
+          <a:lstStyle/>
+          <a:p>
+            <a:r>
+              <a:rPr lang="de-DE" sz="3200" dirty="0"/>
+              <a:t>Hybrid</a:t>
             </a:r>
             <a:endParaRPr lang="de-DE" dirty="0"/>
           </a:p>
@@ -3634,30 +3768,7 @@
       </p:sp>
       <p:sp>
         <p:nvSpPr>
-          <p:cNvPr id="3" name="Text Placeholder 2"/>
-          <p:cNvSpPr>
-            <a:spLocks noGrp="1"/>
-          </p:cNvSpPr>
-          <p:nvPr>
-            <p:ph type="body" idx="1"/>
-          </p:nvPr>
-        </p:nvSpPr>
-        <p:spPr/>
-        <p:txBody>
-          <a:bodyPr/>
-          <a:lstStyle/>
-          <a:p>
-            <a:r>
-              <a:rPr lang="de-DE"/>
-              <a:t>Hybrid</a:t>
-            </a:r>
-            <a:endParaRPr lang="de-DE" dirty="0"/>
-          </a:p>
-        </p:txBody>
-      </p:sp>
-      <p:sp>
-        <p:nvSpPr>
-          <p:cNvPr id="11" name="Content Placeholder 10"/>
+          <p:cNvPr id="4" name="Content Placeholder 3"/>
           <p:cNvSpPr>
             <a:spLocks noGrp="1"/>
           </p:cNvSpPr>
@@ -3670,7 +3781,10 @@
           <a:bodyPr/>
           <a:lstStyle/>
           <a:p>
-            <a:endParaRPr lang="de-DE"/>
+            <a:r>
+              <a:rPr lang="de-DE" dirty="0"/>
+              <a:t>App wird wie jede andere native App geöffnet und erwartet native Performance und Feeling</a:t>
+            </a:r>
           </a:p>
         </p:txBody>
       </p:sp>
@@ -3686,20 +3800,21 @@
         </p:nvSpPr>
         <p:spPr/>
         <p:txBody>
-          <a:bodyPr/>
-          <a:lstStyle/>
-          <a:p>
-            <a:r>
-              <a:rPr lang="de-DE"/>
+          <a:bodyPr>
+            <a:normAutofit/>
+          </a:bodyPr>
+          <a:lstStyle/>
+          <a:p>
+            <a:r>
+              <a:rPr lang="de-DE" sz="3200" dirty="0"/>
               <a:t>Web-App (SPA)</a:t>
             </a:r>
-            <a:endParaRPr lang="de-DE" dirty="0"/>
-          </a:p>
-        </p:txBody>
-      </p:sp>
-      <p:sp>
-        <p:nvSpPr>
-          <p:cNvPr id="12" name="Content Placeholder 11"/>
+          </a:p>
+        </p:txBody>
+      </p:sp>
+      <p:sp>
+        <p:nvSpPr>
+          <p:cNvPr id="6" name="Content Placeholder 5"/>
           <p:cNvSpPr>
             <a:spLocks noGrp="1"/>
           </p:cNvSpPr>
@@ -3712,7 +3827,27 @@
           <a:bodyPr/>
           <a:lstStyle/>
           <a:p>
-            <a:endParaRPr lang="de-DE"/>
+            <a:r>
+              <a:rPr lang="de-DE" b="1" dirty="0">
+                <a:solidFill>
+                  <a:schemeClr val="accent6"/>
+                </a:solidFill>
+              </a:rPr>
+              <a:t>App wird über Browser geladen:</a:t>
+            </a:r>
+          </a:p>
+          <a:p>
+            <a:pPr marL="0" indent="0">
+              <a:buNone/>
+            </a:pPr>
+            <a:r>
+              <a:rPr lang="de-DE" b="1" dirty="0">
+                <a:solidFill>
+                  <a:schemeClr val="accent6"/>
+                </a:solidFill>
+              </a:rPr>
+              <a:t>-&gt; Anwender erwartet Web-App und nur semi-native UX</a:t>
+            </a:r>
           </a:p>
         </p:txBody>
       </p:sp>
@@ -3748,7 +3883,7 @@
     </p:spTree>
     <p:extLst>
       <p:ext uri="{BB962C8B-B14F-4D97-AF65-F5344CB8AC3E}">
-        <p14:creationId xmlns:p14="http://schemas.microsoft.com/office/powerpoint/2010/main" val="649065147"/>
+        <p14:creationId xmlns:p14="http://schemas.microsoft.com/office/powerpoint/2010/main" val="4162622600"/>
       </p:ext>
     </p:extLst>
   </p:cSld>
@@ -3810,7 +3945,7 @@
         <p:spPr/>
         <p:txBody>
           <a:bodyPr>
-            <a:normAutofit fontScale="92500" lnSpcReduction="10000"/>
+            <a:normAutofit fontScale="77500" lnSpcReduction="20000"/>
           </a:bodyPr>
           <a:lstStyle/>
           <a:p>
@@ -3907,6 +4042,36 @@
               <a:rPr lang="de-DE" u="sng" dirty="0"/>
               <a:t>Hybrid vs. Web-App</a:t>
             </a:r>
+          </a:p>
+          <a:p>
+            <a:pPr marL="0" indent="0">
+              <a:buNone/>
+            </a:pPr>
+            <a:r>
+              <a:rPr lang="de-DE" u="sng" dirty="0">
+                <a:hlinkClick r:id="rId6"/>
+              </a:rPr>
+              <a:t>https://www.mobiloud.com/blog/native-web-or-hybrid-apps/</a:t>
+            </a:r>
+            <a:endParaRPr lang="de-DE" u="sng" dirty="0"/>
+          </a:p>
+          <a:p>
+            <a:pPr marL="0" indent="0">
+              <a:buNone/>
+            </a:pPr>
+            <a:r>
+              <a:rPr lang="de-DE" u="sng" dirty="0">
+                <a:hlinkClick r:id="rId7"/>
+              </a:rPr>
+              <a:t>https://app3null.com/native-hybride-web-apps/</a:t>
+            </a:r>
+            <a:endParaRPr lang="de-DE" u="sng" dirty="0"/>
+          </a:p>
+          <a:p>
+            <a:pPr marL="0" indent="0">
+              <a:buNone/>
+            </a:pPr>
+            <a:endParaRPr lang="de-DE" u="sng" dirty="0"/>
           </a:p>
         </p:txBody>
       </p:sp>

</xml_diff>